<commit_message>
Added regular expressions slides
</commit_message>
<xml_diff>
--- a/Training Materials/Week 2/Day 1/1. Interfaces and Nested Types/Slides/2. Nested Types and Anonymous Classes/nested-types-and-anonymous-classes-slides.pptx
+++ b/Training Materials/Week 2/Day 1/1. Interfaces and Nested Types/Slides/2. Nested Types and Anonymous Classes/nested-types-and-anonymous-classes-slides.pptx
@@ -12380,54 +12380,6 @@
                 </a:lnTo>
                 <a:lnTo>
                   <a:pt x="642543" y="0"/>
-                </a:lnTo>
-                <a:close/>
-              </a:path>
-            </a:pathLst>
-          </a:custGeom>
-          <a:solidFill>
-            <a:srgbClr val="171717"/>
-          </a:solidFill>
-        </p:spPr>
-        <p:txBody>
-          <a:bodyPr wrap="square" lIns="0" tIns="0" rIns="0" bIns="0" rtlCol="0"/>
-          <a:lstStyle/>
-          <a:p/>
-        </p:txBody>
-      </p:sp>
-      <p:sp>
-        <p:nvSpPr>
-          <p:cNvPr id="7" name="object 7"/>
-          <p:cNvSpPr/>
-          <p:nvPr/>
-        </p:nvSpPr>
-        <p:spPr>
-          <a:xfrm>
-            <a:off x="5568191" y="1309305"/>
-            <a:ext cx="317500" cy="340995"/>
-          </a:xfrm>
-          <a:custGeom>
-            <a:avLst/>
-            <a:gdLst/>
-            <a:ahLst/>
-            <a:cxnLst/>
-            <a:rect l="l" t="t" r="r" b="b"/>
-            <a:pathLst>
-              <a:path w="317500" h="340994">
-                <a:moveTo>
-                  <a:pt x="317044" y="0"/>
-                </a:moveTo>
-                <a:lnTo>
-                  <a:pt x="0" y="0"/>
-                </a:lnTo>
-                <a:lnTo>
-                  <a:pt x="0" y="340467"/>
-                </a:lnTo>
-                <a:lnTo>
-                  <a:pt x="317044" y="340467"/>
-                </a:lnTo>
-                <a:lnTo>
-                  <a:pt x="317044" y="0"/>
                 </a:lnTo>
                 <a:close/>
               </a:path>

</xml_diff>